<commit_message>
docs: add term pic, update code, refle, test
</commit_message>
<xml_diff>
--- a/Design/proofPic.pptx
+++ b/Design/proofPic.pptx
@@ -8,6 +8,8 @@
     <p:sldId id="256" r:id="rId2"/>
     <p:sldId id="257" r:id="rId3"/>
     <p:sldId id="258" r:id="rId4"/>
+    <p:sldId id="260" r:id="rId5"/>
+    <p:sldId id="259" r:id="rId6"/>
   </p:sldIdLst>
   <p:sldSz cx="12192000" cy="6858000"/>
   <p:notesSz cx="6858000" cy="9144000"/>
@@ -112,6 +114,14 @@
     </p:ext>
   </p:extLst>
 </p:presentation>
+</file>
+
+<file path=ppt/revisionInfo.xml><?xml version="1.0" encoding="utf-8"?>
+<p1510:revInfo xmlns:a="http://schemas.openxmlformats.org/drawingml/2006/main" xmlns:r="http://schemas.openxmlformats.org/officeDocument/2006/relationships" xmlns:p1510="http://schemas.microsoft.com/office/powerpoint/2015/10/main">
+  <p1510:revLst>
+    <p1510:client id="{487B78D9-02AC-40CE-9D7A-C4EE86BB04D5}" v="3" dt="2021-03-31T09:05:39.161"/>
+  </p1510:revLst>
+</p1510:revInfo>
 </file>
 
 <file path=ppt/changesInfos/changesInfo1.xml><?xml version="1.0" encoding="utf-8"?>
@@ -277,8 +287,8 @@
   </pc:docChgLst>
   <pc:docChgLst>
     <pc:chgData name="陈 诗量" userId="791c94ee7340d2cd" providerId="LiveId" clId="{487B78D9-02AC-40CE-9D7A-C4EE86BB04D5}"/>
-    <pc:docChg chg="addSld modSld">
-      <pc:chgData name="陈 诗量" userId="791c94ee7340d2cd" providerId="LiveId" clId="{487B78D9-02AC-40CE-9D7A-C4EE86BB04D5}" dt="2021-03-29T11:37:10.949" v="64" actId="20577"/>
+    <pc:docChg chg="custSel addSld modSld">
+      <pc:chgData name="陈 诗量" userId="791c94ee7340d2cd" providerId="LiveId" clId="{487B78D9-02AC-40CE-9D7A-C4EE86BB04D5}" dt="2021-03-31T09:06:43.024" v="468" actId="20577"/>
       <pc:docMkLst>
         <pc:docMk/>
       </pc:docMkLst>
@@ -296,6 +306,76 @@
             <ac:spMk id="2" creationId="{FC6259EB-C1DA-4049-ADD5-385F632BF63E}"/>
           </ac:spMkLst>
         </pc:spChg>
+      </pc:sldChg>
+      <pc:sldChg chg="addSp delSp modSp new mod">
+        <pc:chgData name="陈 诗量" userId="791c94ee7340d2cd" providerId="LiveId" clId="{487B78D9-02AC-40CE-9D7A-C4EE86BB04D5}" dt="2021-03-31T09:06:43.024" v="468" actId="20577"/>
+        <pc:sldMkLst>
+          <pc:docMk/>
+          <pc:sldMk cId="2366838955" sldId="259"/>
+        </pc:sldMkLst>
+        <pc:spChg chg="del">
+          <ac:chgData name="陈 诗量" userId="791c94ee7340d2cd" providerId="LiveId" clId="{487B78D9-02AC-40CE-9D7A-C4EE86BB04D5}" dt="2021-03-31T09:05:19.231" v="431" actId="478"/>
+          <ac:spMkLst>
+            <pc:docMk/>
+            <pc:sldMk cId="2366838955" sldId="259"/>
+            <ac:spMk id="2" creationId="{32BE6EC4-5724-4D9B-8F0E-57E5A964D8EF}"/>
+          </ac:spMkLst>
+        </pc:spChg>
+        <pc:spChg chg="del">
+          <ac:chgData name="陈 诗量" userId="791c94ee7340d2cd" providerId="LiveId" clId="{487B78D9-02AC-40CE-9D7A-C4EE86BB04D5}" dt="2021-03-31T09:05:17.800" v="430" actId="478"/>
+          <ac:spMkLst>
+            <pc:docMk/>
+            <pc:sldMk cId="2366838955" sldId="259"/>
+            <ac:spMk id="3" creationId="{D51C1025-728C-49C6-B2F9-B842A9E94FE7}"/>
+          </ac:spMkLst>
+        </pc:spChg>
+        <pc:spChg chg="add mod">
+          <ac:chgData name="陈 诗量" userId="791c94ee7340d2cd" providerId="LiveId" clId="{487B78D9-02AC-40CE-9D7A-C4EE86BB04D5}" dt="2021-03-31T09:06:43.024" v="468" actId="20577"/>
+          <ac:spMkLst>
+            <pc:docMk/>
+            <pc:sldMk cId="2366838955" sldId="259"/>
+            <ac:spMk id="7" creationId="{2B3D8C34-5626-4DFD-9B75-BA7D87883B5B}"/>
+          </ac:spMkLst>
+        </pc:spChg>
+        <pc:picChg chg="add mod">
+          <ac:chgData name="陈 诗量" userId="791c94ee7340d2cd" providerId="LiveId" clId="{487B78D9-02AC-40CE-9D7A-C4EE86BB04D5}" dt="2021-03-31T09:05:21.694" v="433" actId="27614"/>
+          <ac:picMkLst>
+            <pc:docMk/>
+            <pc:sldMk cId="2366838955" sldId="259"/>
+            <ac:picMk id="5" creationId="{122161E9-635B-42EC-97B1-2617D0BCC95E}"/>
+          </ac:picMkLst>
+        </pc:picChg>
+        <pc:cxnChg chg="add mod">
+          <ac:chgData name="陈 诗量" userId="791c94ee7340d2cd" providerId="LiveId" clId="{487B78D9-02AC-40CE-9D7A-C4EE86BB04D5}" dt="2021-03-31T09:06:17.560" v="440" actId="208"/>
+          <ac:cxnSpMkLst>
+            <pc:docMk/>
+            <pc:sldMk cId="2366838955" sldId="259"/>
+            <ac:cxnSpMk id="6" creationId="{82116A64-E2A2-4CD0-A957-F5B3DBCFB41A}"/>
+          </ac:cxnSpMkLst>
+        </pc:cxnChg>
+      </pc:sldChg>
+      <pc:sldChg chg="addSp modSp add mod">
+        <pc:chgData name="陈 诗量" userId="791c94ee7340d2cd" providerId="LiveId" clId="{487B78D9-02AC-40CE-9D7A-C4EE86BB04D5}" dt="2021-03-31T09:01:30.570" v="429" actId="20577"/>
+        <pc:sldMkLst>
+          <pc:docMk/>
+          <pc:sldMk cId="2461885919" sldId="260"/>
+        </pc:sldMkLst>
+        <pc:spChg chg="mod">
+          <ac:chgData name="陈 诗量" userId="791c94ee7340d2cd" providerId="LiveId" clId="{487B78D9-02AC-40CE-9D7A-C4EE86BB04D5}" dt="2021-03-31T09:01:30.570" v="429" actId="20577"/>
+          <ac:spMkLst>
+            <pc:docMk/>
+            <pc:sldMk cId="2461885919" sldId="260"/>
+            <ac:spMk id="2" creationId="{FC6259EB-C1DA-4049-ADD5-385F632BF63E}"/>
+          </ac:spMkLst>
+        </pc:spChg>
+        <pc:picChg chg="add mod">
+          <ac:chgData name="陈 诗量" userId="791c94ee7340d2cd" providerId="LiveId" clId="{487B78D9-02AC-40CE-9D7A-C4EE86BB04D5}" dt="2021-03-31T08:55:55.827" v="70" actId="1076"/>
+          <ac:picMkLst>
+            <pc:docMk/>
+            <pc:sldMk cId="2461885919" sldId="260"/>
+            <ac:picMk id="4" creationId="{39FCBB25-11C5-4691-AA43-D77CE710F343}"/>
+          </ac:picMkLst>
+        </pc:picChg>
       </pc:sldChg>
     </pc:docChg>
   </pc:docChgLst>
@@ -449,7 +529,7 @@
           <a:p>
             <a:fld id="{619D8475-9397-4F1F-95EB-CDD2DB8BC787}" type="datetimeFigureOut">
               <a:rPr lang="zh-CN" altLang="en-US" smtClean="0"/>
-              <a:t>21/3/29</a:t>
+              <a:t>21/3/31</a:t>
             </a:fld>
             <a:endParaRPr lang="zh-CN" altLang="en-US"/>
           </a:p>
@@ -647,7 +727,7 @@
           <a:p>
             <a:fld id="{619D8475-9397-4F1F-95EB-CDD2DB8BC787}" type="datetimeFigureOut">
               <a:rPr lang="zh-CN" altLang="en-US" smtClean="0"/>
-              <a:t>21/3/29</a:t>
+              <a:t>21/3/31</a:t>
             </a:fld>
             <a:endParaRPr lang="zh-CN" altLang="en-US"/>
           </a:p>
@@ -855,7 +935,7 @@
           <a:p>
             <a:fld id="{619D8475-9397-4F1F-95EB-CDD2DB8BC787}" type="datetimeFigureOut">
               <a:rPr lang="zh-CN" altLang="en-US" smtClean="0"/>
-              <a:t>21/3/29</a:t>
+              <a:t>21/3/31</a:t>
             </a:fld>
             <a:endParaRPr lang="zh-CN" altLang="en-US"/>
           </a:p>
@@ -1053,7 +1133,7 @@
           <a:p>
             <a:fld id="{619D8475-9397-4F1F-95EB-CDD2DB8BC787}" type="datetimeFigureOut">
               <a:rPr lang="zh-CN" altLang="en-US" smtClean="0"/>
-              <a:t>21/3/29</a:t>
+              <a:t>21/3/31</a:t>
             </a:fld>
             <a:endParaRPr lang="zh-CN" altLang="en-US"/>
           </a:p>
@@ -1328,7 +1408,7 @@
           <a:p>
             <a:fld id="{619D8475-9397-4F1F-95EB-CDD2DB8BC787}" type="datetimeFigureOut">
               <a:rPr lang="zh-CN" altLang="en-US" smtClean="0"/>
-              <a:t>21/3/29</a:t>
+              <a:t>21/3/31</a:t>
             </a:fld>
             <a:endParaRPr lang="zh-CN" altLang="en-US"/>
           </a:p>
@@ -1593,7 +1673,7 @@
           <a:p>
             <a:fld id="{619D8475-9397-4F1F-95EB-CDD2DB8BC787}" type="datetimeFigureOut">
               <a:rPr lang="zh-CN" altLang="en-US" smtClean="0"/>
-              <a:t>21/3/29</a:t>
+              <a:t>21/3/31</a:t>
             </a:fld>
             <a:endParaRPr lang="zh-CN" altLang="en-US"/>
           </a:p>
@@ -2005,7 +2085,7 @@
           <a:p>
             <a:fld id="{619D8475-9397-4F1F-95EB-CDD2DB8BC787}" type="datetimeFigureOut">
               <a:rPr lang="zh-CN" altLang="en-US" smtClean="0"/>
-              <a:t>21/3/29</a:t>
+              <a:t>21/3/31</a:t>
             </a:fld>
             <a:endParaRPr lang="zh-CN" altLang="en-US"/>
           </a:p>
@@ -2146,7 +2226,7 @@
           <a:p>
             <a:fld id="{619D8475-9397-4F1F-95EB-CDD2DB8BC787}" type="datetimeFigureOut">
               <a:rPr lang="zh-CN" altLang="en-US" smtClean="0"/>
-              <a:t>21/3/29</a:t>
+              <a:t>21/3/31</a:t>
             </a:fld>
             <a:endParaRPr lang="zh-CN" altLang="en-US"/>
           </a:p>
@@ -2259,7 +2339,7 @@
           <a:p>
             <a:fld id="{619D8475-9397-4F1F-95EB-CDD2DB8BC787}" type="datetimeFigureOut">
               <a:rPr lang="zh-CN" altLang="en-US" smtClean="0"/>
-              <a:t>21/3/29</a:t>
+              <a:t>21/3/31</a:t>
             </a:fld>
             <a:endParaRPr lang="zh-CN" altLang="en-US"/>
           </a:p>
@@ -2570,7 +2650,7 @@
           <a:p>
             <a:fld id="{619D8475-9397-4F1F-95EB-CDD2DB8BC787}" type="datetimeFigureOut">
               <a:rPr lang="zh-CN" altLang="en-US" smtClean="0"/>
-              <a:t>21/3/29</a:t>
+              <a:t>21/3/31</a:t>
             </a:fld>
             <a:endParaRPr lang="zh-CN" altLang="en-US"/>
           </a:p>
@@ -2858,7 +2938,7 @@
           <a:p>
             <a:fld id="{619D8475-9397-4F1F-95EB-CDD2DB8BC787}" type="datetimeFigureOut">
               <a:rPr lang="zh-CN" altLang="en-US" smtClean="0"/>
-              <a:t>21/3/29</a:t>
+              <a:t>21/3/31</a:t>
             </a:fld>
             <a:endParaRPr lang="zh-CN" altLang="en-US"/>
           </a:p>
@@ -3099,7 +3179,7 @@
           <a:p>
             <a:fld id="{619D8475-9397-4F1F-95EB-CDD2DB8BC787}" type="datetimeFigureOut">
               <a:rPr lang="zh-CN" altLang="en-US" smtClean="0"/>
-              <a:t>21/3/29</a:t>
+              <a:t>21/3/31</a:t>
             </a:fld>
             <a:endParaRPr lang="zh-CN" altLang="en-US"/>
           </a:p>
@@ -4314,6 +4394,314 @@
 </p:sld>
 </file>
 
+<file path=ppt/slides/slide4.xml><?xml version="1.0" encoding="utf-8"?>
+<p:sld xmlns:a="http://schemas.openxmlformats.org/drawingml/2006/main" xmlns:r="http://schemas.openxmlformats.org/officeDocument/2006/relationships" xmlns:p="http://schemas.openxmlformats.org/presentationml/2006/main">
+  <p:cSld>
+    <p:spTree>
+      <p:nvGrpSpPr>
+        <p:cNvPr id="1" name=""/>
+        <p:cNvGrpSpPr/>
+        <p:nvPr/>
+      </p:nvGrpSpPr>
+      <p:grpSpPr>
+        <a:xfrm>
+          <a:off x="0" y="0"/>
+          <a:ext cx="0" cy="0"/>
+          <a:chOff x="0" y="0"/>
+          <a:chExt cx="0" cy="0"/>
+        </a:xfrm>
+      </p:grpSpPr>
+      <p:sp>
+        <p:nvSpPr>
+          <p:cNvPr id="2" name="文本框 1">
+            <a:extLst>
+              <a:ext uri="{FF2B5EF4-FFF2-40B4-BE49-F238E27FC236}">
+                <a16:creationId xmlns:a16="http://schemas.microsoft.com/office/drawing/2014/main" id="{FC6259EB-C1DA-4049-ADD5-385F632BF63E}"/>
+              </a:ext>
+            </a:extLst>
+          </p:cNvPr>
+          <p:cNvSpPr txBox="1"/>
+          <p:nvPr/>
+        </p:nvSpPr>
+        <p:spPr>
+          <a:xfrm>
+            <a:off x="1797978" y="3105834"/>
+            <a:ext cx="5496674" cy="2954655"/>
+          </a:xfrm>
+          <a:prstGeom prst="rect">
+            <a:avLst/>
+          </a:prstGeom>
+          <a:noFill/>
+        </p:spPr>
+        <p:txBody>
+          <a:bodyPr wrap="square" rtlCol="0">
+            <a:spAutoFit/>
+          </a:bodyPr>
+          <a:lstStyle/>
+          <a:p>
+            <a:r>
+              <a:rPr lang="en-US" altLang="zh-CN" sz="2400" b="1" dirty="0">
+                <a:solidFill>
+                  <a:srgbClr val="4CAF50"/>
+                </a:solidFill>
+                <a:latin typeface="Quicksand" pitchFamily="2" charset="0"/>
+              </a:rPr>
+              <a:t>Terminology</a:t>
+            </a:r>
+          </a:p>
+          <a:p>
+            <a:endParaRPr lang="en-US" altLang="zh-CN" dirty="0">
+              <a:solidFill>
+                <a:srgbClr val="FC7315"/>
+              </a:solidFill>
+              <a:latin typeface="Quicksand" pitchFamily="2" charset="0"/>
+            </a:endParaRPr>
+          </a:p>
+          <a:p>
+            <a:r>
+              <a:rPr lang="en-US" altLang="zh-CN" dirty="0">
+                <a:latin typeface="Quicksand" pitchFamily="2" charset="0"/>
+              </a:rPr>
+              <a:t>In this module, we introduce you basic knowledge about pseudo-code.</a:t>
+            </a:r>
+          </a:p>
+          <a:p>
+            <a:endParaRPr lang="en-US" altLang="zh-CN" dirty="0">
+              <a:latin typeface="Quicksand" pitchFamily="2" charset="0"/>
+            </a:endParaRPr>
+          </a:p>
+          <a:p>
+            <a:r>
+              <a:rPr lang="en-GB" altLang="zh-CN" dirty="0">
+                <a:latin typeface="Quicksand" pitchFamily="2" charset="0"/>
+              </a:rPr>
+              <a:t>We may use some symbols and syntax in pseudo-code in iCanSort. You will get to know some simple expressions, syntax and structures by viewing this module.</a:t>
+            </a:r>
+            <a:endParaRPr lang="en-US" altLang="zh-CN" dirty="0">
+              <a:latin typeface="Quicksand" pitchFamily="2" charset="0"/>
+            </a:endParaRPr>
+          </a:p>
+          <a:p>
+            <a:endParaRPr kumimoji="1" lang="zh-CN" altLang="en-US" dirty="0"/>
+          </a:p>
+        </p:txBody>
+      </p:sp>
+      <p:pic>
+        <p:nvPicPr>
+          <p:cNvPr id="4" name="Picture 3">
+            <a:extLst>
+              <a:ext uri="{FF2B5EF4-FFF2-40B4-BE49-F238E27FC236}">
+                <a16:creationId xmlns:a16="http://schemas.microsoft.com/office/drawing/2014/main" id="{39FCBB25-11C5-4691-AA43-D77CE710F343}"/>
+              </a:ext>
+            </a:extLst>
+          </p:cNvPr>
+          <p:cNvPicPr>
+            <a:picLocks noChangeAspect="1"/>
+          </p:cNvPicPr>
+          <p:nvPr/>
+        </p:nvPicPr>
+        <p:blipFill>
+          <a:blip r:embed="rId2"/>
+          <a:stretch>
+            <a:fillRect/>
+          </a:stretch>
+        </p:blipFill>
+        <p:spPr>
+          <a:xfrm>
+            <a:off x="9348186" y="1382003"/>
+            <a:ext cx="140979" cy="542925"/>
+          </a:xfrm>
+          <a:prstGeom prst="rect">
+            <a:avLst/>
+          </a:prstGeom>
+        </p:spPr>
+      </p:pic>
+    </p:spTree>
+    <p:extLst>
+      <p:ext uri="{BB962C8B-B14F-4D97-AF65-F5344CB8AC3E}">
+        <p14:creationId xmlns:p14="http://schemas.microsoft.com/office/powerpoint/2010/main" val="2461885919"/>
+      </p:ext>
+    </p:extLst>
+  </p:cSld>
+  <p:clrMapOvr>
+    <a:masterClrMapping/>
+  </p:clrMapOvr>
+</p:sld>
+</file>
+
+<file path=ppt/slides/slide5.xml><?xml version="1.0" encoding="utf-8"?>
+<p:sld xmlns:a="http://schemas.openxmlformats.org/drawingml/2006/main" xmlns:r="http://schemas.openxmlformats.org/officeDocument/2006/relationships" xmlns:p="http://schemas.openxmlformats.org/presentationml/2006/main">
+  <p:cSld>
+    <p:spTree>
+      <p:nvGrpSpPr>
+        <p:cNvPr id="1" name=""/>
+        <p:cNvGrpSpPr/>
+        <p:nvPr/>
+      </p:nvGrpSpPr>
+      <p:grpSpPr>
+        <a:xfrm>
+          <a:off x="0" y="0"/>
+          <a:ext cx="0" cy="0"/>
+          <a:chOff x="0" y="0"/>
+          <a:chExt cx="0" cy="0"/>
+        </a:xfrm>
+      </p:grpSpPr>
+      <p:pic>
+        <p:nvPicPr>
+          <p:cNvPr id="5" name="Picture 4" descr="Graphical user interface, application&#10;&#10;Description automatically generated">
+            <a:extLst>
+              <a:ext uri="{FF2B5EF4-FFF2-40B4-BE49-F238E27FC236}">
+                <a16:creationId xmlns:a16="http://schemas.microsoft.com/office/drawing/2014/main" id="{122161E9-635B-42EC-97B1-2617D0BCC95E}"/>
+              </a:ext>
+            </a:extLst>
+          </p:cNvPr>
+          <p:cNvPicPr>
+            <a:picLocks noChangeAspect="1"/>
+          </p:cNvPicPr>
+          <p:nvPr/>
+        </p:nvPicPr>
+        <p:blipFill>
+          <a:blip r:embed="rId2">
+            <a:extLst>
+              <a:ext uri="{28A0092B-C50C-407E-A947-70E740481C1C}">
+                <a14:useLocalDpi xmlns:a14="http://schemas.microsoft.com/office/drawing/2010/main" val="0"/>
+              </a:ext>
+            </a:extLst>
+          </a:blip>
+          <a:stretch>
+            <a:fillRect/>
+          </a:stretch>
+        </p:blipFill>
+        <p:spPr>
+          <a:xfrm>
+            <a:off x="4952941" y="2628859"/>
+            <a:ext cx="2286117" cy="1600282"/>
+          </a:xfrm>
+          <a:prstGeom prst="rect">
+            <a:avLst/>
+          </a:prstGeom>
+        </p:spPr>
+      </p:pic>
+      <p:cxnSp>
+        <p:nvCxnSpPr>
+          <p:cNvPr id="6" name="直接连接符 83">
+            <a:extLst>
+              <a:ext uri="{FF2B5EF4-FFF2-40B4-BE49-F238E27FC236}">
+                <a16:creationId xmlns:a16="http://schemas.microsoft.com/office/drawing/2014/main" id="{82116A64-E2A2-4CD0-A957-F5B3DBCFB41A}"/>
+              </a:ext>
+            </a:extLst>
+          </p:cNvPr>
+          <p:cNvCxnSpPr>
+            <a:cxnSpLocks/>
+          </p:cNvCxnSpPr>
+          <p:nvPr/>
+        </p:nvCxnSpPr>
+        <p:spPr>
+          <a:xfrm flipH="1">
+            <a:off x="6722526" y="2951856"/>
+            <a:ext cx="1017408" cy="637688"/>
+          </a:xfrm>
+          <a:prstGeom prst="line">
+            <a:avLst/>
+          </a:prstGeom>
+          <a:ln>
+            <a:solidFill>
+              <a:srgbClr val="4CAF50"/>
+            </a:solidFill>
+          </a:ln>
+        </p:spPr>
+        <p:style>
+          <a:lnRef idx="1">
+            <a:schemeClr val="accent1"/>
+          </a:lnRef>
+          <a:fillRef idx="0">
+            <a:schemeClr val="accent1"/>
+          </a:fillRef>
+          <a:effectRef idx="0">
+            <a:schemeClr val="accent1"/>
+          </a:effectRef>
+          <a:fontRef idx="minor">
+            <a:schemeClr val="tx1"/>
+          </a:fontRef>
+        </p:style>
+      </p:cxnSp>
+      <p:sp>
+        <p:nvSpPr>
+          <p:cNvPr id="7" name="矩形: 圆角 69">
+            <a:extLst>
+              <a:ext uri="{FF2B5EF4-FFF2-40B4-BE49-F238E27FC236}">
+                <a16:creationId xmlns:a16="http://schemas.microsoft.com/office/drawing/2014/main" id="{2B3D8C34-5626-4DFD-9B75-BA7D87883B5B}"/>
+              </a:ext>
+            </a:extLst>
+          </p:cNvPr>
+          <p:cNvSpPr/>
+          <p:nvPr/>
+        </p:nvSpPr>
+        <p:spPr>
+          <a:xfrm>
+            <a:off x="7739934" y="2707975"/>
+            <a:ext cx="1120546" cy="487761"/>
+          </a:xfrm>
+          <a:prstGeom prst="roundRect">
+            <a:avLst/>
+          </a:prstGeom>
+          <a:solidFill>
+            <a:srgbClr val="4CAF50"/>
+          </a:solidFill>
+          <a:ln>
+            <a:solidFill>
+              <a:srgbClr val="4CAF50"/>
+            </a:solidFill>
+          </a:ln>
+        </p:spPr>
+        <p:style>
+          <a:lnRef idx="2">
+            <a:schemeClr val="accent1">
+              <a:shade val="50000"/>
+            </a:schemeClr>
+          </a:lnRef>
+          <a:fillRef idx="1">
+            <a:schemeClr val="accent1"/>
+          </a:fillRef>
+          <a:effectRef idx="0">
+            <a:schemeClr val="accent1"/>
+          </a:effectRef>
+          <a:fontRef idx="minor">
+            <a:schemeClr val="lt1"/>
+          </a:fontRef>
+        </p:style>
+        <p:txBody>
+          <a:bodyPr rtlCol="0" anchor="ctr"/>
+          <a:lstStyle/>
+          <a:p>
+            <a:pPr algn="ctr"/>
+            <a:r>
+              <a:rPr lang="en-US" altLang="zh-CN" sz="1400" dirty="0">
+                <a:latin typeface="Quicksand" pitchFamily="2" charset="0"/>
+                <a:cs typeface="Arial" panose="020B0604020202020204" pitchFamily="34" charset="0"/>
+              </a:rPr>
+              <a:t>Four  Sections</a:t>
+            </a:r>
+            <a:endParaRPr lang="zh-CN" altLang="en-US" sz="1400" dirty="0">
+              <a:latin typeface="Quicksand" pitchFamily="2" charset="0"/>
+              <a:cs typeface="Arial" panose="020B0604020202020204" pitchFamily="34" charset="0"/>
+            </a:endParaRPr>
+          </a:p>
+        </p:txBody>
+      </p:sp>
+    </p:spTree>
+    <p:extLst>
+      <p:ext uri="{BB962C8B-B14F-4D97-AF65-F5344CB8AC3E}">
+        <p14:creationId xmlns:p14="http://schemas.microsoft.com/office/powerpoint/2010/main" val="2366838955"/>
+      </p:ext>
+    </p:extLst>
+  </p:cSld>
+  <p:clrMapOvr>
+    <a:masterClrMapping/>
+  </p:clrMapOvr>
+</p:sld>
+</file>
+
 <file path=ppt/theme/theme1.xml><?xml version="1.0" encoding="utf-8"?>
 <a:theme xmlns:a="http://schemas.openxmlformats.org/drawingml/2006/main" name="Office 主题​​">
   <a:themeElements>

</xml_diff>